<commit_message>
Fix GLONAF vs GIFT last typo in workflow diagram
</commit_message>
<xml_diff>
--- a/log/workflow.pptx
+++ b/log/workflow.pptx
@@ -3946,8 +3946,8 @@
         </p:nvSpPr>
         <p:spPr>
           <a:xfrm>
-            <a:off x="262432" y="4025332"/>
-            <a:ext cx="2329336" cy="1679197"/>
+            <a:off x="262431" y="4375586"/>
+            <a:ext cx="2682397" cy="1328943"/>
           </a:xfrm>
           <a:prstGeom prst="rect">
             <a:avLst/>
@@ -3981,11 +3981,11 @@
             <a:pPr algn="ctr"/>
             <a:r>
               <a:rPr lang="en-US" dirty="0"/>
-              <a:t>Alien status for unique species x </a:t>
+              <a:t>Alien status for unique species x GIFT</a:t>
             </a:r>
             <a:r>
               <a:rPr lang="ro-RO" dirty="0"/>
-              <a:t>GloNAF </a:t>
+              <a:t> </a:t>
             </a:r>
             <a:r>
               <a:rPr lang="en-US" dirty="0" err="1"/>
@@ -4349,7 +4349,7 @@
         </p:nvSpPr>
         <p:spPr>
           <a:xfrm>
-            <a:off x="8342851" y="3022570"/>
+            <a:off x="8342850" y="2752047"/>
             <a:ext cx="2329336" cy="784371"/>
           </a:xfrm>
           <a:prstGeom prst="rect">
@@ -4424,7 +4424,7 @@
         <p:spPr>
           <a:xfrm>
             <a:off x="9507519" y="1159078"/>
-            <a:ext cx="0" cy="773488"/>
+            <a:ext cx="0" cy="699126"/>
           </a:xfrm>
           <a:prstGeom prst="straightConnector1">
             <a:avLst/>
@@ -4467,7 +4467,7 @@
         <p:spPr>
           <a:xfrm flipH="1" flipV="1">
             <a:off x="5575186" y="3113477"/>
-            <a:ext cx="2767665" cy="301279"/>
+            <a:ext cx="2767664" cy="30756"/>
           </a:xfrm>
           <a:prstGeom prst="straightConnector1">
             <a:avLst/>
@@ -4510,7 +4510,7 @@
         <p:spPr>
           <a:xfrm>
             <a:off x="1087730" y="1159078"/>
-            <a:ext cx="335288" cy="1796164"/>
+            <a:ext cx="515900" cy="1805494"/>
           </a:xfrm>
           <a:prstGeom prst="straightConnector1">
             <a:avLst/>
@@ -4813,7 +4813,7 @@
         </p:nvSpPr>
         <p:spPr>
           <a:xfrm>
-            <a:off x="109132" y="2955242"/>
+            <a:off x="289744" y="2964572"/>
             <a:ext cx="2627771" cy="297810"/>
           </a:xfrm>
           <a:prstGeom prst="roundRect">
@@ -4868,7 +4868,7 @@
         </p:nvSpPr>
         <p:spPr>
           <a:xfrm>
-            <a:off x="7969541" y="1932566"/>
+            <a:off x="7969541" y="1858204"/>
             <a:ext cx="3075955" cy="297810"/>
           </a:xfrm>
           <a:prstGeom prst="roundRect">
@@ -5228,9 +5228,9 @@
           <p:nvPr/>
         </p:nvCxnSpPr>
         <p:spPr>
-          <a:xfrm>
-            <a:off x="9507519" y="2230376"/>
-            <a:ext cx="0" cy="792194"/>
+          <a:xfrm flipH="1">
+            <a:off x="9507518" y="2156014"/>
+            <a:ext cx="1" cy="596033"/>
           </a:xfrm>
           <a:prstGeom prst="straightConnector1">
             <a:avLst/>
@@ -5272,8 +5272,8 @@
         </p:nvCxnSpPr>
         <p:spPr>
           <a:xfrm>
-            <a:off x="1423018" y="3253052"/>
-            <a:ext cx="4082" cy="772280"/>
+            <a:off x="1603630" y="3262382"/>
+            <a:ext cx="0" cy="1113204"/>
           </a:xfrm>
           <a:prstGeom prst="straightConnector1">
             <a:avLst/>
@@ -5405,6 +5405,7 @@
             </a:extLst>
           </p:cNvPr>
           <p:cNvCxnSpPr>
+            <a:cxnSpLocks/>
             <a:stCxn id="12" idx="2"/>
             <a:endCxn id="163" idx="1"/>
           </p:cNvCxnSpPr>
@@ -5412,8 +5413,8 @@
         </p:nvCxnSpPr>
         <p:spPr>
           <a:xfrm rot="16200000" flipH="1">
-            <a:off x="3538549" y="3593079"/>
-            <a:ext cx="713749" cy="4936647"/>
+            <a:off x="3626814" y="3681344"/>
+            <a:ext cx="713749" cy="4760117"/>
           </a:xfrm>
           <a:prstGeom prst="bentConnector2">
             <a:avLst/>

</xml_diff>